<commit_message>
updated for OSS Prague 2017
</commit_message>
<xml_diff>
--- a/hp-msa-thrift.pptx
+++ b/hp-msa-thrift.pptx
@@ -2185,7 +2185,7 @@
           <a:p>
             <a:fld id="{96BEDBCA-D170-43AA-96CF-9A15605EEF92}" type="datetimeFigureOut">
               <a:rPr lang="en-US" smtClean="0"/>
-              <a:t>2017-06-01</a:t>
+              <a:t>2017-10-19</a:t>
             </a:fld>
             <a:endParaRPr lang="en-US"/>
           </a:p>
@@ -2353,7 +2353,7 @@
           <a:p>
             <a:fld id="{96BEDBCA-D170-43AA-96CF-9A15605EEF92}" type="datetimeFigureOut">
               <a:rPr lang="en-US" smtClean="0"/>
-              <a:t>2017-06-01</a:t>
+              <a:t>2017-10-19</a:t>
             </a:fld>
             <a:endParaRPr lang="en-US"/>
           </a:p>
@@ -2531,7 +2531,7 @@
           <a:p>
             <a:fld id="{96BEDBCA-D170-43AA-96CF-9A15605EEF92}" type="datetimeFigureOut">
               <a:rPr lang="en-US" smtClean="0"/>
-              <a:t>2017-06-01</a:t>
+              <a:t>2017-10-19</a:t>
             </a:fld>
             <a:endParaRPr lang="en-US"/>
           </a:p>
@@ -2699,7 +2699,7 @@
           <a:p>
             <a:fld id="{96BEDBCA-D170-43AA-96CF-9A15605EEF92}" type="datetimeFigureOut">
               <a:rPr lang="en-US" smtClean="0"/>
-              <a:t>2017-06-01</a:t>
+              <a:t>2017-10-19</a:t>
             </a:fld>
             <a:endParaRPr lang="en-US"/>
           </a:p>
@@ -2944,7 +2944,7 @@
           <a:p>
             <a:fld id="{96BEDBCA-D170-43AA-96CF-9A15605EEF92}" type="datetimeFigureOut">
               <a:rPr lang="en-US" smtClean="0"/>
-              <a:t>2017-06-01</a:t>
+              <a:t>2017-10-19</a:t>
             </a:fld>
             <a:endParaRPr lang="en-US"/>
           </a:p>
@@ -3173,7 +3173,7 @@
           <a:p>
             <a:fld id="{96BEDBCA-D170-43AA-96CF-9A15605EEF92}" type="datetimeFigureOut">
               <a:rPr lang="en-US" smtClean="0"/>
-              <a:t>2017-06-01</a:t>
+              <a:t>2017-10-19</a:t>
             </a:fld>
             <a:endParaRPr lang="en-US"/>
           </a:p>
@@ -3537,7 +3537,7 @@
           <a:p>
             <a:fld id="{96BEDBCA-D170-43AA-96CF-9A15605EEF92}" type="datetimeFigureOut">
               <a:rPr lang="en-US" smtClean="0"/>
-              <a:t>2017-06-01</a:t>
+              <a:t>2017-10-19</a:t>
             </a:fld>
             <a:endParaRPr lang="en-US"/>
           </a:p>
@@ -3654,7 +3654,7 @@
           <a:p>
             <a:fld id="{96BEDBCA-D170-43AA-96CF-9A15605EEF92}" type="datetimeFigureOut">
               <a:rPr lang="en-US" smtClean="0"/>
-              <a:t>2017-06-01</a:t>
+              <a:t>2017-10-19</a:t>
             </a:fld>
             <a:endParaRPr lang="en-US"/>
           </a:p>
@@ -3749,7 +3749,7 @@
           <a:p>
             <a:fld id="{96BEDBCA-D170-43AA-96CF-9A15605EEF92}" type="datetimeFigureOut">
               <a:rPr lang="en-US" smtClean="0"/>
-              <a:t>2017-06-01</a:t>
+              <a:t>2017-10-19</a:t>
             </a:fld>
             <a:endParaRPr lang="en-US"/>
           </a:p>
@@ -4024,7 +4024,7 @@
           <a:p>
             <a:fld id="{96BEDBCA-D170-43AA-96CF-9A15605EEF92}" type="datetimeFigureOut">
               <a:rPr lang="en-US" smtClean="0"/>
-              <a:t>2017-06-01</a:t>
+              <a:t>2017-10-19</a:t>
             </a:fld>
             <a:endParaRPr lang="en-US"/>
           </a:p>
@@ -4276,7 +4276,7 @@
           <a:p>
             <a:fld id="{96BEDBCA-D170-43AA-96CF-9A15605EEF92}" type="datetimeFigureOut">
               <a:rPr lang="en-US" smtClean="0"/>
-              <a:t>2017-06-01</a:t>
+              <a:t>2017-10-19</a:t>
             </a:fld>
             <a:endParaRPr lang="en-US"/>
           </a:p>
@@ -4487,7 +4487,7 @@
           <a:p>
             <a:fld id="{96BEDBCA-D170-43AA-96CF-9A15605EEF92}" type="datetimeFigureOut">
               <a:rPr lang="en-US" smtClean="0"/>
-              <a:t>2017-06-01</a:t>
+              <a:t>2017-10-19</a:t>
             </a:fld>
             <a:endParaRPr lang="en-US"/>
           </a:p>
@@ -4904,7 +4904,7 @@
         </p:nvSpPr>
         <p:spPr>
           <a:xfrm>
-            <a:off x="164325" y="207963"/>
+            <a:off x="164325" y="347114"/>
             <a:ext cx="11826242" cy="2105867"/>
           </a:xfrm>
         </p:spPr>
@@ -4947,7 +4947,7 @@
         </p:nvSpPr>
         <p:spPr>
           <a:xfrm>
-            <a:off x="164324" y="2830666"/>
+            <a:off x="164324" y="3097037"/>
             <a:ext cx="10347299" cy="572494"/>
           </a:xfrm>
         </p:spPr>
@@ -4965,43 +4965,32 @@
       </p:sp>
       <p:pic>
         <p:nvPicPr>
-          <p:cNvPr id="1026" name="Picture 2" descr="Image result for opensource summit japan"/>
+          <p:cNvPr id="5" name="Picture 4">
+            <a:extLst>
+              <a:ext uri="{FF2B5EF4-FFF2-40B4-BE49-F238E27FC236}">
+                <a16:creationId xmlns:a16="http://schemas.microsoft.com/office/drawing/2014/main" id="{5054ADB1-9C30-4126-B707-E20B53DA0E64}"/>
+              </a:ext>
+            </a:extLst>
+          </p:cNvPr>
           <p:cNvPicPr>
-            <a:picLocks noChangeAspect="1" noChangeArrowheads="1"/>
+            <a:picLocks noChangeAspect="1"/>
           </p:cNvPicPr>
           <p:nvPr/>
         </p:nvPicPr>
         <p:blipFill>
-          <a:blip r:embed="rId2">
-            <a:extLst>
-              <a:ext uri="{28A0092B-C50C-407E-A947-70E740481C1C}">
-                <a14:useLocalDpi xmlns:a14="http://schemas.microsoft.com/office/drawing/2010/main" val="0"/>
-              </a:ext>
-            </a:extLst>
-          </a:blip>
-          <a:srcRect/>
+          <a:blip r:embed="rId2"/>
           <a:stretch>
             <a:fillRect/>
           </a:stretch>
         </p:blipFill>
-        <p:spPr bwMode="auto">
-          <a:xfrm>
-            <a:off x="0" y="3657601"/>
-            <a:ext cx="12192000" cy="3200400"/>
+        <p:spPr>
+          <a:xfrm>
+            <a:off x="0" y="4727049"/>
+            <a:ext cx="12193974" cy="2119023"/>
           </a:xfrm>
           <a:prstGeom prst="rect">
             <a:avLst/>
           </a:prstGeom>
-          <a:noFill/>
-          <a:extLst>
-            <a:ext uri="{909E8E84-426E-40DD-AFC4-6F175D3DCCD1}">
-              <a14:hiddenFill xmlns:a14="http://schemas.microsoft.com/office/drawing/2010/main">
-                <a:solidFill>
-                  <a:srgbClr val="FFFFFF"/>
-                </a:solidFill>
-              </a14:hiddenFill>
-            </a:ext>
-          </a:extLst>
         </p:spPr>
       </p:pic>
     </p:spTree>
@@ -5577,10 +5566,9 @@
           <a:p>
             <a:pPr lvl="1"/>
             <a:r>
-              <a:rPr lang="en-US" dirty="0" err="1"/>
-              <a:t>Loadbalancers</a:t>
-            </a:r>
-            <a:endParaRPr lang="en-US" dirty="0"/>
+              <a:rPr lang="en-US" dirty="0"/>
+              <a:t>Load balancers</a:t>
+            </a:r>
           </a:p>
           <a:p>
             <a:pPr lvl="1"/>
@@ -6454,29 +6442,24 @@
             <a:pPr lvl="1"/>
             <a:r>
               <a:rPr lang="en-US" dirty="0"/>
-              <a:t>RX-M Cloud Native Consulting Partner</a:t>
+              <a:t>Partner RX-M Cloud Native Consulting</a:t>
             </a:r>
           </a:p>
           <a:p>
             <a:r>
               <a:rPr lang="en-US" b="1" dirty="0"/>
-              <a:t>Nobuaki</a:t>
-            </a:r>
-            <a:r>
-              <a:rPr lang="en-US" dirty="0"/>
-              <a:t> </a:t>
-            </a:r>
-            <a:r>
-              <a:rPr lang="en-US" dirty="0" err="1"/>
-              <a:t>Sukegawa</a:t>
-            </a:r>
-            <a:endParaRPr lang="en-US" dirty="0"/>
+              <a:t>Jens</a:t>
+            </a:r>
+            <a:r>
+              <a:rPr lang="en-US" dirty="0"/>
+              <a:t> Geyer</a:t>
+            </a:r>
           </a:p>
           <a:p>
             <a:pPr lvl="1"/>
             <a:r>
               <a:rPr lang="en-US" dirty="0"/>
-              <a:t>nsuke@apache.org</a:t>
+              <a:t>jensg@apache.org</a:t>
             </a:r>
           </a:p>
           <a:p>
@@ -6490,11 +6473,8 @@
             <a:pPr lvl="1"/>
             <a:r>
               <a:rPr lang="en-US" dirty="0"/>
-              <a:t>Bloomberg Engineer</a:t>
-            </a:r>
-          </a:p>
-          <a:p>
-            <a:endParaRPr lang="en-US" dirty="0"/>
+              <a:t>Senior Software Engineer at VSX Vogel Software GmbH</a:t>
+            </a:r>
           </a:p>
         </p:txBody>
       </p:sp>
@@ -6514,7 +6494,7 @@
         </p:blipFill>
         <p:spPr>
           <a:xfrm>
-            <a:off x="8248650" y="2549331"/>
+            <a:off x="8602404" y="2403417"/>
             <a:ext cx="3105150" cy="742950"/>
           </a:xfrm>
           <a:prstGeom prst="rect">
@@ -6524,7 +6504,7 @@
       </p:pic>
       <p:pic>
         <p:nvPicPr>
-          <p:cNvPr id="8" name="Picture 7"/>
+          <p:cNvPr id="10" name="Picture 9"/>
           <p:cNvPicPr>
             <a:picLocks noChangeAspect="1"/>
           </p:cNvPicPr>
@@ -6538,32 +6518,8 @@
         </p:blipFill>
         <p:spPr>
           <a:xfrm>
-            <a:off x="7524750" y="3622692"/>
-            <a:ext cx="3829050" cy="1190625"/>
-          </a:xfrm>
-          <a:prstGeom prst="rect">
-            <a:avLst/>
-          </a:prstGeom>
-        </p:spPr>
-      </p:pic>
-      <p:pic>
-        <p:nvPicPr>
-          <p:cNvPr id="10" name="Picture 9"/>
-          <p:cNvPicPr>
-            <a:picLocks noChangeAspect="1"/>
-          </p:cNvPicPr>
-          <p:nvPr/>
-        </p:nvPicPr>
-        <p:blipFill>
-          <a:blip r:embed="rId4"/>
-          <a:stretch>
-            <a:fillRect/>
-          </a:stretch>
-        </p:blipFill>
-        <p:spPr>
-          <a:xfrm>
-            <a:off x="9010650" y="5028537"/>
-            <a:ext cx="857250" cy="1524000"/>
+            <a:off x="9780367" y="5303270"/>
+            <a:ext cx="749222" cy="1331951"/>
           </a:xfrm>
           <a:prstGeom prst="rect">
             <a:avLst/>
@@ -6579,7 +6535,7 @@
           <p:nvPr/>
         </p:nvPicPr>
         <p:blipFill>
-          <a:blip r:embed="rId5">
+          <a:blip r:embed="rId4">
             <a:extLst>
               <a:ext uri="{28A0092B-C50C-407E-A947-70E740481C1C}">
                 <a14:useLocalDpi xmlns:a14="http://schemas.microsoft.com/office/drawing/2010/main" val="0"/>
@@ -6593,8 +6549,53 @@
         </p:blipFill>
         <p:spPr bwMode="auto">
           <a:xfrm>
-            <a:off x="8678538" y="461977"/>
-            <a:ext cx="1521474" cy="1518413"/>
+            <a:off x="9505449" y="648713"/>
+            <a:ext cx="1299060" cy="1296446"/>
+          </a:xfrm>
+          <a:prstGeom prst="rect">
+            <a:avLst/>
+          </a:prstGeom>
+          <a:noFill/>
+          <a:extLst>
+            <a:ext uri="{909E8E84-426E-40DD-AFC4-6F175D3DCCD1}">
+              <a14:hiddenFill xmlns:a14="http://schemas.microsoft.com/office/drawing/2010/main">
+                <a:solidFill>
+                  <a:srgbClr val="FFFFFF"/>
+                </a:solidFill>
+              </a14:hiddenFill>
+            </a:ext>
+          </a:extLst>
+        </p:spPr>
+      </p:pic>
+      <p:pic>
+        <p:nvPicPr>
+          <p:cNvPr id="1026" name="Picture 2" descr="https://www.vsx.net/pics/header.jpg">
+            <a:extLst>
+              <a:ext uri="{FF2B5EF4-FFF2-40B4-BE49-F238E27FC236}">
+                <a16:creationId xmlns:a16="http://schemas.microsoft.com/office/drawing/2014/main" id="{95C89DAC-EA2A-4603-8E49-3523464EF35D}"/>
+              </a:ext>
+            </a:extLst>
+          </p:cNvPr>
+          <p:cNvPicPr>
+            <a:picLocks noChangeAspect="1" noChangeArrowheads="1"/>
+          </p:cNvPicPr>
+          <p:nvPr/>
+        </p:nvPicPr>
+        <p:blipFill rotWithShape="1">
+          <a:blip r:embed="rId5">
+            <a:extLst>
+              <a:ext uri="{28A0092B-C50C-407E-A947-70E740481C1C}">
+                <a14:useLocalDpi xmlns:a14="http://schemas.microsoft.com/office/drawing/2010/main" val="0"/>
+              </a:ext>
+            </a:extLst>
+          </a:blip>
+          <a:srcRect l="75690"/>
+          <a:stretch/>
+        </p:blipFill>
+        <p:spPr bwMode="auto">
+          <a:xfrm>
+            <a:off x="9167812" y="3604625"/>
+            <a:ext cx="1974333" cy="1411766"/>
           </a:xfrm>
           <a:prstGeom prst="rect">
             <a:avLst/>
@@ -9252,7 +9253,7 @@
             </a:r>
             <a:r>
               <a:rPr lang="en-US" dirty="0"/>
-              <a:t>just over a year</a:t>
+              <a:t>in just over a year</a:t>
             </a:r>
           </a:p>
           <a:p>
@@ -9280,7 +9281,7 @@
             </a:r>
             <a:r>
               <a:rPr lang="en-US" dirty="0"/>
-              <a:t> Go is a </a:t>
+              <a:t> Go: a </a:t>
             </a:r>
             <a:r>
               <a:rPr lang="en-US" dirty="0">
@@ -11073,11 +11074,18 @@
                 <a:solidFill>
                   <a:schemeClr val="accent2"/>
                 </a:solidFill>
+                <a:highlight>
+                  <a:srgbClr val="FFFF00"/>
+                </a:highlight>
               </a:rPr>
               <a:t>2006</a:t>
             </a:r>
             <a:r>
-              <a:rPr lang="en-US" dirty="0"/>
+              <a:rPr lang="en-US" dirty="0">
+                <a:highlight>
+                  <a:srgbClr val="FFFF00"/>
+                </a:highlight>
+              </a:rPr>
               <a:t> - </a:t>
             </a:r>
             <a:r>
@@ -11085,11 +11093,18 @@
                 <a:solidFill>
                   <a:schemeClr val="accent1"/>
                 </a:solidFill>
+                <a:highlight>
+                  <a:srgbClr val="FFFF00"/>
+                </a:highlight>
               </a:rPr>
               <a:t>Apache Thrift </a:t>
             </a:r>
             <a:r>
-              <a:rPr lang="en-US" dirty="0"/>
+              <a:rPr lang="en-US" dirty="0">
+                <a:highlight>
+                  <a:srgbClr val="FFFF00"/>
+                </a:highlight>
+              </a:rPr>
               <a:t>– developed at Facebook to solve REST performance problems and to glue their servers together across many languages</a:t>
             </a:r>
           </a:p>
@@ -11097,7 +11112,7 @@
             <a:pPr lvl="1"/>
             <a:r>
               <a:rPr lang="en-US" dirty="0"/>
-              <a:t>The basis for Twitter Finagle, a cornerstone of the Twitter platform</a:t>
+              <a:t>The basis for Twitter Finagle, an important facet of the Twitter platform</a:t>
             </a:r>
           </a:p>
           <a:p>

</xml_diff>